<commit_message>
v1.5.2 - Buf fix   + Wrong softResetOn deteccion after hibernation   + Temp & Hum calibration for case model 2
</commit_message>
<xml_diff>
--- a/icons/logo/madiot.pptx
+++ b/icons/logo/madiot.pptx
@@ -31,6 +31,8 @@
     <p:sldId id="280" r:id="rId25"/>
     <p:sldId id="281" r:id="rId26"/>
     <p:sldId id="282" r:id="rId27"/>
+    <p:sldId id="286" r:id="rId28"/>
+    <p:sldId id="287" r:id="rId29"/>
   </p:sldIdLst>
   <p:sldSz cx="12192000" cy="6858000"/>
   <p:notesSz cx="6858000" cy="9144000"/>
@@ -284,7 +286,7 @@
           <a:p>
             <a:fld id="{0CDC4453-4148-1246-ADDD-314ACCE51B3C}" type="datetimeFigureOut">
               <a:rPr lang="es-ES" smtClean="0"/>
-              <a:t>12/2/23</a:t>
+              <a:t>3/6/23</a:t>
             </a:fld>
             <a:endParaRPr lang="es-ES"/>
           </a:p>
@@ -482,7 +484,7 @@
           <a:p>
             <a:fld id="{0CDC4453-4148-1246-ADDD-314ACCE51B3C}" type="datetimeFigureOut">
               <a:rPr lang="es-ES" smtClean="0"/>
-              <a:t>12/2/23</a:t>
+              <a:t>3/6/23</a:t>
             </a:fld>
             <a:endParaRPr lang="es-ES"/>
           </a:p>
@@ -690,7 +692,7 @@
           <a:p>
             <a:fld id="{0CDC4453-4148-1246-ADDD-314ACCE51B3C}" type="datetimeFigureOut">
               <a:rPr lang="es-ES" smtClean="0"/>
-              <a:t>12/2/23</a:t>
+              <a:t>3/6/23</a:t>
             </a:fld>
             <a:endParaRPr lang="es-ES"/>
           </a:p>
@@ -888,7 +890,7 @@
           <a:p>
             <a:fld id="{0CDC4453-4148-1246-ADDD-314ACCE51B3C}" type="datetimeFigureOut">
               <a:rPr lang="es-ES" smtClean="0"/>
-              <a:t>12/2/23</a:t>
+              <a:t>3/6/23</a:t>
             </a:fld>
             <a:endParaRPr lang="es-ES"/>
           </a:p>
@@ -1163,7 +1165,7 @@
           <a:p>
             <a:fld id="{0CDC4453-4148-1246-ADDD-314ACCE51B3C}" type="datetimeFigureOut">
               <a:rPr lang="es-ES" smtClean="0"/>
-              <a:t>12/2/23</a:t>
+              <a:t>3/6/23</a:t>
             </a:fld>
             <a:endParaRPr lang="es-ES"/>
           </a:p>
@@ -1428,7 +1430,7 @@
           <a:p>
             <a:fld id="{0CDC4453-4148-1246-ADDD-314ACCE51B3C}" type="datetimeFigureOut">
               <a:rPr lang="es-ES" smtClean="0"/>
-              <a:t>12/2/23</a:t>
+              <a:t>3/6/23</a:t>
             </a:fld>
             <a:endParaRPr lang="es-ES"/>
           </a:p>
@@ -1840,7 +1842,7 @@
           <a:p>
             <a:fld id="{0CDC4453-4148-1246-ADDD-314ACCE51B3C}" type="datetimeFigureOut">
               <a:rPr lang="es-ES" smtClean="0"/>
-              <a:t>12/2/23</a:t>
+              <a:t>3/6/23</a:t>
             </a:fld>
             <a:endParaRPr lang="es-ES"/>
           </a:p>
@@ -1981,7 +1983,7 @@
           <a:p>
             <a:fld id="{0CDC4453-4148-1246-ADDD-314ACCE51B3C}" type="datetimeFigureOut">
               <a:rPr lang="es-ES" smtClean="0"/>
-              <a:t>12/2/23</a:t>
+              <a:t>3/6/23</a:t>
             </a:fld>
             <a:endParaRPr lang="es-ES"/>
           </a:p>
@@ -2094,7 +2096,7 @@
           <a:p>
             <a:fld id="{0CDC4453-4148-1246-ADDD-314ACCE51B3C}" type="datetimeFigureOut">
               <a:rPr lang="es-ES" smtClean="0"/>
-              <a:t>12/2/23</a:t>
+              <a:t>3/6/23</a:t>
             </a:fld>
             <a:endParaRPr lang="es-ES"/>
           </a:p>
@@ -2405,7 +2407,7 @@
           <a:p>
             <a:fld id="{0CDC4453-4148-1246-ADDD-314ACCE51B3C}" type="datetimeFigureOut">
               <a:rPr lang="es-ES" smtClean="0"/>
-              <a:t>12/2/23</a:t>
+              <a:t>3/6/23</a:t>
             </a:fld>
             <a:endParaRPr lang="es-ES"/>
           </a:p>
@@ -2693,7 +2695,7 @@
           <a:p>
             <a:fld id="{0CDC4453-4148-1246-ADDD-314ACCE51B3C}" type="datetimeFigureOut">
               <a:rPr lang="es-ES" smtClean="0"/>
-              <a:t>12/2/23</a:t>
+              <a:t>3/6/23</a:t>
             </a:fld>
             <a:endParaRPr lang="es-ES"/>
           </a:p>
@@ -2934,7 +2936,7 @@
           <a:p>
             <a:fld id="{0CDC4453-4148-1246-ADDD-314ACCE51B3C}" type="datetimeFigureOut">
               <a:rPr lang="es-ES" smtClean="0"/>
-              <a:t>12/2/23</a:t>
+              <a:t>3/6/23</a:t>
             </a:fld>
             <a:endParaRPr lang="es-ES"/>
           </a:p>
@@ -6510,6 +6512,495 @@
 </p:sld>
 </file>
 
+<file path=ppt/slides/slide27.xml><?xml version="1.0" encoding="utf-8"?>
+<p:sld xmlns:a="http://schemas.openxmlformats.org/drawingml/2006/main" xmlns:r="http://schemas.openxmlformats.org/officeDocument/2006/relationships" xmlns:p="http://schemas.openxmlformats.org/presentationml/2006/main">
+  <p:cSld>
+    <p:spTree>
+      <p:nvGrpSpPr>
+        <p:cNvPr id="1" name=""/>
+        <p:cNvGrpSpPr/>
+        <p:nvPr/>
+      </p:nvGrpSpPr>
+      <p:grpSpPr>
+        <a:xfrm>
+          <a:off x="0" y="0"/>
+          <a:ext cx="0" cy="0"/>
+          <a:chOff x="0" y="0"/>
+          <a:chExt cx="0" cy="0"/>
+        </a:xfrm>
+      </p:grpSpPr>
+      <p:sp>
+        <p:nvSpPr>
+          <p:cNvPr id="2" name="Rectángulo 1">
+            <a:extLst>
+              <a:ext uri="{FF2B5EF4-FFF2-40B4-BE49-F238E27FC236}">
+                <a16:creationId xmlns:a16="http://schemas.microsoft.com/office/drawing/2014/main" id="{6CF225B7-10CE-6B44-85CE-9652DA1AA616}"/>
+              </a:ext>
+            </a:extLst>
+          </p:cNvPr>
+          <p:cNvSpPr/>
+          <p:nvPr/>
+        </p:nvSpPr>
+        <p:spPr>
+          <a:xfrm>
+            <a:off x="0" y="0"/>
+            <a:ext cx="12192000" cy="6858000"/>
+          </a:xfrm>
+          <a:prstGeom prst="rect">
+            <a:avLst/>
+          </a:prstGeom>
+        </p:spPr>
+        <p:style>
+          <a:lnRef idx="2">
+            <a:schemeClr val="dk1">
+              <a:shade val="50000"/>
+            </a:schemeClr>
+          </a:lnRef>
+          <a:fillRef idx="1">
+            <a:schemeClr val="dk1"/>
+          </a:fillRef>
+          <a:effectRef idx="0">
+            <a:schemeClr val="dk1"/>
+          </a:effectRef>
+          <a:fontRef idx="minor">
+            <a:schemeClr val="lt1"/>
+          </a:fontRef>
+        </p:style>
+        <p:txBody>
+          <a:bodyPr rtlCol="0" anchor="ctr"/>
+          <a:lstStyle/>
+          <a:p>
+            <a:pPr algn="ctr"/>
+            <a:endParaRPr lang="es-ES"/>
+          </a:p>
+        </p:txBody>
+      </p:sp>
+      <p:sp>
+        <p:nvSpPr>
+          <p:cNvPr id="6" name="Rectángulo 5">
+            <a:extLst>
+              <a:ext uri="{FF2B5EF4-FFF2-40B4-BE49-F238E27FC236}">
+                <a16:creationId xmlns:a16="http://schemas.microsoft.com/office/drawing/2014/main" id="{B06CEE47-B4E4-0641-87C4-EDE8932F0684}"/>
+              </a:ext>
+            </a:extLst>
+          </p:cNvPr>
+          <p:cNvSpPr/>
+          <p:nvPr/>
+        </p:nvSpPr>
+        <p:spPr>
+          <a:xfrm>
+            <a:off x="1457324" y="2171698"/>
+            <a:ext cx="9629775" cy="1958608"/>
+          </a:xfrm>
+          <a:prstGeom prst="rect">
+            <a:avLst/>
+          </a:prstGeom>
+          <a:solidFill>
+            <a:schemeClr val="bg1">
+              <a:lumMod val="85000"/>
+            </a:schemeClr>
+          </a:solidFill>
+          <a:scene3d>
+            <a:camera prst="perspectiveContrastingRightFacing">
+              <a:rot lat="20399998" lon="0" rev="0"/>
+            </a:camera>
+            <a:lightRig rig="balanced" dir="t"/>
+          </a:scene3d>
+          <a:sp3d extrusionH="190500" contourW="38100">
+            <a:extrusionClr>
+              <a:schemeClr val="bg1">
+                <a:lumMod val="85000"/>
+              </a:schemeClr>
+            </a:extrusionClr>
+            <a:contourClr>
+              <a:schemeClr val="bg2">
+                <a:lumMod val="75000"/>
+              </a:schemeClr>
+            </a:contourClr>
+          </a:sp3d>
+        </p:spPr>
+        <p:style>
+          <a:lnRef idx="2">
+            <a:schemeClr val="accent1">
+              <a:shade val="50000"/>
+            </a:schemeClr>
+          </a:lnRef>
+          <a:fillRef idx="1">
+            <a:schemeClr val="accent1"/>
+          </a:fillRef>
+          <a:effectRef idx="0">
+            <a:schemeClr val="accent1"/>
+          </a:effectRef>
+          <a:fontRef idx="minor">
+            <a:schemeClr val="lt1"/>
+          </a:fontRef>
+        </p:style>
+        <p:txBody>
+          <a:bodyPr rtlCol="0" anchor="ctr">
+            <a:sp3d prstMaterial="flat"/>
+          </a:bodyPr>
+          <a:lstStyle/>
+          <a:p>
+            <a:pPr algn="ctr"/>
+            <a:endParaRPr lang="es-ES" dirty="0"/>
+          </a:p>
+        </p:txBody>
+      </p:sp>
+      <p:sp>
+        <p:nvSpPr>
+          <p:cNvPr id="7" name="CuadroTexto 6">
+            <a:extLst>
+              <a:ext uri="{FF2B5EF4-FFF2-40B4-BE49-F238E27FC236}">
+                <a16:creationId xmlns:a16="http://schemas.microsoft.com/office/drawing/2014/main" id="{30F57DF1-8080-1445-B1E9-B506D9CB1B80}"/>
+              </a:ext>
+            </a:extLst>
+          </p:cNvPr>
+          <p:cNvSpPr txBox="1"/>
+          <p:nvPr/>
+        </p:nvSpPr>
+        <p:spPr>
+          <a:xfrm>
+            <a:off x="1585916" y="2343163"/>
+            <a:ext cx="9629775" cy="1631216"/>
+          </a:xfrm>
+          <a:prstGeom prst="rect">
+            <a:avLst/>
+          </a:prstGeom>
+          <a:noFill/>
+        </p:spPr>
+        <p:txBody>
+          <a:bodyPr wrap="square" rtlCol="0">
+            <a:spAutoFit/>
+            <a:scene3d>
+              <a:camera prst="orthographicFront">
+                <a:rot lat="19800000" lon="0" rev="0"/>
+              </a:camera>
+              <a:lightRig rig="threePt" dir="t"/>
+            </a:scene3d>
+            <a:sp3d>
+              <a:bevelT w="0" h="0"/>
+              <a:bevelB w="0" h="0"/>
+            </a:sp3d>
+          </a:bodyPr>
+          <a:lstStyle/>
+          <a:p>
+            <a:r>
+              <a:rPr lang="es-ES" sz="10000" dirty="0" err="1">
+                <a:solidFill>
+                  <a:schemeClr val="accent5"/>
+                </a:solidFill>
+                <a:effectLst>
+                  <a:outerShdw sx="1000" sy="1000" algn="ctr" rotWithShape="0">
+                    <a:srgbClr val="000000"/>
+                  </a:outerShdw>
+                </a:effectLst>
+              </a:rPr>
+              <a:t>The</a:t>
+            </a:r>
+            <a:r>
+              <a:rPr lang="es-ES" sz="10000" dirty="0">
+                <a:solidFill>
+                  <a:schemeClr val="accent5"/>
+                </a:solidFill>
+                <a:effectLst>
+                  <a:outerShdw sx="1000" sy="1000" algn="ctr" rotWithShape="0">
+                    <a:srgbClr val="000000"/>
+                  </a:outerShdw>
+                </a:effectLst>
+              </a:rPr>
+              <a:t> </a:t>
+            </a:r>
+            <a:r>
+              <a:rPr lang="es-ES" sz="10000" dirty="0" err="1">
+                <a:solidFill>
+                  <a:schemeClr val="accent5"/>
+                </a:solidFill>
+                <a:effectLst>
+                  <a:outerShdw sx="1000" sy="1000" algn="ctr" rotWithShape="0">
+                    <a:srgbClr val="000000"/>
+                  </a:outerShdw>
+                </a:effectLst>
+              </a:rPr>
+              <a:t>IoT</a:t>
+            </a:r>
+            <a:r>
+              <a:rPr lang="es-ES" sz="10000" dirty="0">
+                <a:solidFill>
+                  <a:schemeClr val="accent5"/>
+                </a:solidFill>
+                <a:effectLst>
+                  <a:outerShdw sx="1000" sy="1000" algn="ctr" rotWithShape="0">
+                    <a:srgbClr val="000000"/>
+                  </a:outerShdw>
+                </a:effectLst>
+              </a:rPr>
+              <a:t> Factory ©</a:t>
+            </a:r>
+          </a:p>
+        </p:txBody>
+      </p:sp>
+    </p:spTree>
+    <p:extLst>
+      <p:ext uri="{BB962C8B-B14F-4D97-AF65-F5344CB8AC3E}">
+        <p14:creationId xmlns:p14="http://schemas.microsoft.com/office/powerpoint/2010/main" val="2699165683"/>
+      </p:ext>
+    </p:extLst>
+  </p:cSld>
+  <p:clrMapOvr>
+    <a:masterClrMapping/>
+  </p:clrMapOvr>
+</p:sld>
+</file>
+
+<file path=ppt/slides/slide28.xml><?xml version="1.0" encoding="utf-8"?>
+<p:sld xmlns:a="http://schemas.openxmlformats.org/drawingml/2006/main" xmlns:r="http://schemas.openxmlformats.org/officeDocument/2006/relationships" xmlns:p="http://schemas.openxmlformats.org/presentationml/2006/main">
+  <p:cSld>
+    <p:spTree>
+      <p:nvGrpSpPr>
+        <p:cNvPr id="1" name=""/>
+        <p:cNvGrpSpPr/>
+        <p:nvPr/>
+      </p:nvGrpSpPr>
+      <p:grpSpPr>
+        <a:xfrm>
+          <a:off x="0" y="0"/>
+          <a:ext cx="0" cy="0"/>
+          <a:chOff x="0" y="0"/>
+          <a:chExt cx="0" cy="0"/>
+        </a:xfrm>
+      </p:grpSpPr>
+      <p:sp>
+        <p:nvSpPr>
+          <p:cNvPr id="2" name="Rectángulo 1">
+            <a:extLst>
+              <a:ext uri="{FF2B5EF4-FFF2-40B4-BE49-F238E27FC236}">
+                <a16:creationId xmlns:a16="http://schemas.microsoft.com/office/drawing/2014/main" id="{6CF225B7-10CE-6B44-85CE-9652DA1AA616}"/>
+              </a:ext>
+            </a:extLst>
+          </p:cNvPr>
+          <p:cNvSpPr/>
+          <p:nvPr/>
+        </p:nvSpPr>
+        <p:spPr>
+          <a:xfrm>
+            <a:off x="0" y="0"/>
+            <a:ext cx="12192000" cy="6858000"/>
+          </a:xfrm>
+          <a:prstGeom prst="rect">
+            <a:avLst/>
+          </a:prstGeom>
+        </p:spPr>
+        <p:style>
+          <a:lnRef idx="2">
+            <a:schemeClr val="dk1">
+              <a:shade val="50000"/>
+            </a:schemeClr>
+          </a:lnRef>
+          <a:fillRef idx="1">
+            <a:schemeClr val="dk1"/>
+          </a:fillRef>
+          <a:effectRef idx="0">
+            <a:schemeClr val="dk1"/>
+          </a:effectRef>
+          <a:fontRef idx="minor">
+            <a:schemeClr val="lt1"/>
+          </a:fontRef>
+        </p:style>
+        <p:txBody>
+          <a:bodyPr rtlCol="0" anchor="ctr"/>
+          <a:lstStyle/>
+          <a:p>
+            <a:pPr algn="ctr"/>
+            <a:endParaRPr lang="es-ES"/>
+          </a:p>
+        </p:txBody>
+      </p:sp>
+      <p:sp>
+        <p:nvSpPr>
+          <p:cNvPr id="6" name="Rectángulo 5">
+            <a:extLst>
+              <a:ext uri="{FF2B5EF4-FFF2-40B4-BE49-F238E27FC236}">
+                <a16:creationId xmlns:a16="http://schemas.microsoft.com/office/drawing/2014/main" id="{B06CEE47-B4E4-0641-87C4-EDE8932F0684}"/>
+              </a:ext>
+            </a:extLst>
+          </p:cNvPr>
+          <p:cNvSpPr/>
+          <p:nvPr/>
+        </p:nvSpPr>
+        <p:spPr>
+          <a:xfrm>
+            <a:off x="1457324" y="2171698"/>
+            <a:ext cx="9629775" cy="1958608"/>
+          </a:xfrm>
+          <a:prstGeom prst="rect">
+            <a:avLst/>
+          </a:prstGeom>
+          <a:solidFill>
+            <a:schemeClr val="bg1">
+              <a:lumMod val="85000"/>
+            </a:schemeClr>
+          </a:solidFill>
+          <a:scene3d>
+            <a:camera prst="perspectiveContrastingRightFacing">
+              <a:rot lat="20399998" lon="0" rev="0"/>
+            </a:camera>
+            <a:lightRig rig="balanced" dir="t"/>
+          </a:scene3d>
+          <a:sp3d extrusionH="190500" contourW="38100" prstMaterial="metal">
+            <a:extrusionClr>
+              <a:schemeClr val="bg1">
+                <a:lumMod val="85000"/>
+              </a:schemeClr>
+            </a:extrusionClr>
+            <a:contourClr>
+              <a:schemeClr val="bg2">
+                <a:lumMod val="75000"/>
+              </a:schemeClr>
+            </a:contourClr>
+          </a:sp3d>
+        </p:spPr>
+        <p:style>
+          <a:lnRef idx="2">
+            <a:schemeClr val="accent1">
+              <a:shade val="50000"/>
+            </a:schemeClr>
+          </a:lnRef>
+          <a:fillRef idx="1">
+            <a:schemeClr val="accent1"/>
+          </a:fillRef>
+          <a:effectRef idx="0">
+            <a:schemeClr val="accent1"/>
+          </a:effectRef>
+          <a:fontRef idx="minor">
+            <a:schemeClr val="lt1"/>
+          </a:fontRef>
+        </p:style>
+        <p:txBody>
+          <a:bodyPr rtlCol="0" anchor="ctr">
+            <a:sp3d prstMaterial="flat"/>
+          </a:bodyPr>
+          <a:lstStyle/>
+          <a:p>
+            <a:pPr algn="ctr"/>
+            <a:endParaRPr lang="es-ES" dirty="0"/>
+          </a:p>
+        </p:txBody>
+      </p:sp>
+      <p:sp>
+        <p:nvSpPr>
+          <p:cNvPr id="7" name="CuadroTexto 6">
+            <a:extLst>
+              <a:ext uri="{FF2B5EF4-FFF2-40B4-BE49-F238E27FC236}">
+                <a16:creationId xmlns:a16="http://schemas.microsoft.com/office/drawing/2014/main" id="{30F57DF1-8080-1445-B1E9-B506D9CB1B80}"/>
+              </a:ext>
+            </a:extLst>
+          </p:cNvPr>
+          <p:cNvSpPr txBox="1"/>
+          <p:nvPr/>
+        </p:nvSpPr>
+        <p:spPr>
+          <a:xfrm>
+            <a:off x="1585916" y="2343163"/>
+            <a:ext cx="9629775" cy="1631216"/>
+          </a:xfrm>
+          <a:prstGeom prst="rect">
+            <a:avLst/>
+          </a:prstGeom>
+          <a:noFill/>
+          <a:scene3d>
+            <a:camera prst="orthographicFront">
+              <a:rot lat="19800000" lon="0" rev="0"/>
+            </a:camera>
+            <a:lightRig rig="threePt" dir="t"/>
+          </a:scene3d>
+          <a:sp3d/>
+        </p:spPr>
+        <p:txBody>
+          <a:bodyPr wrap="square" rtlCol="0">
+            <a:spAutoFit/>
+            <a:sp3d>
+              <a:bevelT w="0" h="0"/>
+              <a:bevelB w="0" h="0"/>
+            </a:sp3d>
+          </a:bodyPr>
+          <a:lstStyle/>
+          <a:p>
+            <a:r>
+              <a:rPr lang="es-ES" sz="10000" dirty="0" err="1">
+                <a:solidFill>
+                  <a:schemeClr val="accent5"/>
+                </a:solidFill>
+                <a:effectLst>
+                  <a:outerShdw blurRad="50800" dist="50800" dir="10800000" algn="ctr" rotWithShape="0">
+                    <a:srgbClr val="000000">
+                      <a:alpha val="43137"/>
+                    </a:srgbClr>
+                  </a:outerShdw>
+                </a:effectLst>
+              </a:rPr>
+              <a:t>The</a:t>
+            </a:r>
+            <a:r>
+              <a:rPr lang="es-ES" sz="10000" dirty="0">
+                <a:solidFill>
+                  <a:schemeClr val="accent5"/>
+                </a:solidFill>
+                <a:effectLst>
+                  <a:outerShdw blurRad="50800" dist="50800" dir="10800000" algn="ctr" rotWithShape="0">
+                    <a:srgbClr val="000000">
+                      <a:alpha val="43137"/>
+                    </a:srgbClr>
+                  </a:outerShdw>
+                </a:effectLst>
+              </a:rPr>
+              <a:t> </a:t>
+            </a:r>
+            <a:r>
+              <a:rPr lang="es-ES" sz="10000" dirty="0" err="1">
+                <a:solidFill>
+                  <a:schemeClr val="accent5"/>
+                </a:solidFill>
+                <a:effectLst>
+                  <a:outerShdw blurRad="50800" dist="50800" dir="10800000" algn="ctr" rotWithShape="0">
+                    <a:srgbClr val="000000">
+                      <a:alpha val="43137"/>
+                    </a:srgbClr>
+                  </a:outerShdw>
+                </a:effectLst>
+              </a:rPr>
+              <a:t>IoT</a:t>
+            </a:r>
+            <a:r>
+              <a:rPr lang="es-ES" sz="10000" dirty="0">
+                <a:solidFill>
+                  <a:schemeClr val="accent5"/>
+                </a:solidFill>
+                <a:effectLst>
+                  <a:outerShdw blurRad="50800" dist="50800" dir="10800000" algn="ctr" rotWithShape="0">
+                    <a:srgbClr val="000000">
+                      <a:alpha val="43137"/>
+                    </a:srgbClr>
+                  </a:outerShdw>
+                </a:effectLst>
+              </a:rPr>
+              <a:t> Factory ©</a:t>
+            </a:r>
+          </a:p>
+        </p:txBody>
+      </p:sp>
+    </p:spTree>
+    <p:extLst>
+      <p:ext uri="{BB962C8B-B14F-4D97-AF65-F5344CB8AC3E}">
+        <p14:creationId xmlns:p14="http://schemas.microsoft.com/office/powerpoint/2010/main" val="4174563493"/>
+      </p:ext>
+    </p:extLst>
+  </p:cSld>
+  <p:clrMapOvr>
+    <a:masterClrMapping/>
+  </p:clrMapOvr>
+</p:sld>
+</file>
+
 <file path=ppt/slides/slide3.xml><?xml version="1.0" encoding="utf-8"?>
 <p:sld xmlns:a="http://schemas.openxmlformats.org/drawingml/2006/main" xmlns:r="http://schemas.openxmlformats.org/officeDocument/2006/relationships" xmlns:p="http://schemas.openxmlformats.org/presentationml/2006/main">
   <p:cSld>

</xml_diff>